<commit_message>
Add results for 7/13
</commit_message>
<xml_diff>
--- a/updates/7-13-17.pptx
+++ b/updates/7-13-17.pptx
@@ -9,9 +9,10 @@
     <p:sldId id="257" r:id="rId3"/>
     <p:sldId id="258" r:id="rId4"/>
     <p:sldId id="259" r:id="rId5"/>
-    <p:sldId id="260" r:id="rId6"/>
-    <p:sldId id="261" r:id="rId7"/>
-    <p:sldId id="262" r:id="rId8"/>
+    <p:sldId id="263" r:id="rId6"/>
+    <p:sldId id="260" r:id="rId7"/>
+    <p:sldId id="261" r:id="rId8"/>
+    <p:sldId id="262" r:id="rId9"/>
   </p:sldIdLst>
   <p:sldSz cx="12192000" cy="6858000"/>
   <p:notesSz cx="6858000" cy="9144000"/>
@@ -287,7 +288,7 @@
           <a:p>
             <a:fld id="{1BB2F573-D864-5540-BB6B-5B387182EA08}" type="datetimeFigureOut">
               <a:rPr lang="en-US" smtClean="0"/>
-              <a:t>7/12/17</a:t>
+              <a:t>7/13/17</a:t>
             </a:fld>
             <a:endParaRPr lang="en-US"/>
           </a:p>
@@ -612,7 +613,7 @@
           <a:p>
             <a:fld id="{1BB2F573-D864-5540-BB6B-5B387182EA08}" type="datetimeFigureOut">
               <a:rPr lang="en-US" smtClean="0"/>
-              <a:t>7/12/17</a:t>
+              <a:t>7/13/17</a:t>
             </a:fld>
             <a:endParaRPr lang="en-US"/>
           </a:p>
@@ -787,7 +788,7 @@
           <a:p>
             <a:fld id="{1BB2F573-D864-5540-BB6B-5B387182EA08}" type="datetimeFigureOut">
               <a:rPr lang="en-US" smtClean="0"/>
-              <a:t>7/12/17</a:t>
+              <a:t>7/13/17</a:t>
             </a:fld>
             <a:endParaRPr lang="en-US"/>
           </a:p>
@@ -952,7 +953,7 @@
           <a:p>
             <a:fld id="{1BB2F573-D864-5540-BB6B-5B387182EA08}" type="datetimeFigureOut">
               <a:rPr lang="en-US" smtClean="0"/>
-              <a:t>7/12/17</a:t>
+              <a:t>7/13/17</a:t>
             </a:fld>
             <a:endParaRPr lang="en-US"/>
           </a:p>
@@ -1224,7 +1225,7 @@
           <a:p>
             <a:fld id="{1BB2F573-D864-5540-BB6B-5B387182EA08}" type="datetimeFigureOut">
               <a:rPr lang="en-US" smtClean="0"/>
-              <a:t>7/12/17</a:t>
+              <a:t>7/13/17</a:t>
             </a:fld>
             <a:endParaRPr lang="en-US"/>
           </a:p>
@@ -1613,7 +1614,7 @@
           <a:p>
             <a:fld id="{1BB2F573-D864-5540-BB6B-5B387182EA08}" type="datetimeFigureOut">
               <a:rPr lang="en-US" smtClean="0"/>
-              <a:t>7/12/17</a:t>
+              <a:t>7/13/17</a:t>
             </a:fld>
             <a:endParaRPr lang="en-US"/>
           </a:p>
@@ -2085,7 +2086,7 @@
           <a:p>
             <a:fld id="{1BB2F573-D864-5540-BB6B-5B387182EA08}" type="datetimeFigureOut">
               <a:rPr lang="en-US" smtClean="0"/>
-              <a:t>7/12/17</a:t>
+              <a:t>7/13/17</a:t>
             </a:fld>
             <a:endParaRPr lang="en-US"/>
           </a:p>
@@ -2198,7 +2199,7 @@
           <a:p>
             <a:fld id="{1BB2F573-D864-5540-BB6B-5B387182EA08}" type="datetimeFigureOut">
               <a:rPr lang="en-US" smtClean="0"/>
-              <a:t>7/12/17</a:t>
+              <a:t>7/13/17</a:t>
             </a:fld>
             <a:endParaRPr lang="en-US"/>
           </a:p>
@@ -2288,7 +2289,7 @@
           <a:p>
             <a:fld id="{1BB2F573-D864-5540-BB6B-5B387182EA08}" type="datetimeFigureOut">
               <a:rPr lang="en-US" smtClean="0"/>
-              <a:t>7/12/17</a:t>
+              <a:t>7/13/17</a:t>
             </a:fld>
             <a:endParaRPr lang="en-US"/>
           </a:p>
@@ -2629,7 +2630,7 @@
           <a:p>
             <a:fld id="{1BB2F573-D864-5540-BB6B-5B387182EA08}" type="datetimeFigureOut">
               <a:rPr lang="en-US" smtClean="0"/>
-              <a:t>7/12/17</a:t>
+              <a:t>7/13/17</a:t>
             </a:fld>
             <a:endParaRPr lang="en-US"/>
           </a:p>
@@ -3012,7 +3013,7 @@
           <a:p>
             <a:fld id="{1BB2F573-D864-5540-BB6B-5B387182EA08}" type="datetimeFigureOut">
               <a:rPr lang="en-US" smtClean="0"/>
-              <a:t>7/12/17</a:t>
+              <a:t>7/13/17</a:t>
             </a:fld>
             <a:endParaRPr lang="en-US"/>
           </a:p>
@@ -3285,7 +3286,7 @@
           <a:p>
             <a:fld id="{1BB2F573-D864-5540-BB6B-5B387182EA08}" type="datetimeFigureOut">
               <a:rPr lang="en-US" smtClean="0"/>
-              <a:t>7/12/17</a:t>
+              <a:t>7/13/17</a:t>
             </a:fld>
             <a:endParaRPr lang="en-US"/>
           </a:p>
@@ -4019,8 +4020,13 @@
           <a:p>
             <a:r>
               <a:rPr lang="en-US" dirty="0" smtClean="0"/>
-              <a:t>Validate on Thermocycler 10/11</a:t>
-            </a:r>
+              <a:t>Validate on </a:t>
+            </a:r>
+            <a:r>
+              <a:rPr lang="en-US" dirty="0" smtClean="0"/>
+              <a:t>Gene Synthesizer 4/14 and Nucleotide Mixer 7/11</a:t>
+            </a:r>
+            <a:endParaRPr lang="en-US" dirty="0" smtClean="0"/>
           </a:p>
           <a:p>
             <a:r>
@@ -4121,26 +4127,123 @@
           </a:p>
         </p:txBody>
       </p:sp>
-      <p:sp>
-        <p:nvSpPr>
-          <p:cNvPr id="3" name="Content Placeholder 2"/>
-          <p:cNvSpPr>
-            <a:spLocks noGrp="1"/>
-          </p:cNvSpPr>
-          <p:nvPr>
-            <p:ph idx="1"/>
-          </p:nvPr>
-        </p:nvSpPr>
-        <p:spPr/>
-        <p:txBody>
-          <a:bodyPr/>
+      <p:pic>
+        <p:nvPicPr>
+          <p:cNvPr id="4" name="Picture 3"/>
+          <p:cNvPicPr>
+            <a:picLocks noChangeAspect="1"/>
+          </p:cNvPicPr>
+          <p:nvPr/>
+        </p:nvPicPr>
+        <p:blipFill>
+          <a:blip r:embed="rId2">
+            <a:extLst>
+              <a:ext uri="{28A0092B-C50C-407E-A947-70E740481C1C}">
+                <a14:useLocalDpi xmlns:a14="http://schemas.microsoft.com/office/drawing/2010/main" val="0"/>
+              </a:ext>
+            </a:extLst>
+          </a:blip>
+          <a:stretch>
+            <a:fillRect/>
+          </a:stretch>
+        </p:blipFill>
+        <p:spPr>
+          <a:xfrm>
+            <a:off x="2095167" y="2193307"/>
+            <a:ext cx="3628736" cy="3327307"/>
+          </a:xfrm>
+          <a:prstGeom prst="rect">
+            <a:avLst/>
+          </a:prstGeom>
+        </p:spPr>
+      </p:pic>
+      <p:pic>
+        <p:nvPicPr>
+          <p:cNvPr id="5" name="Picture 4"/>
+          <p:cNvPicPr>
+            <a:picLocks noChangeAspect="1"/>
+          </p:cNvPicPr>
+          <p:nvPr/>
+        </p:nvPicPr>
+        <p:blipFill>
+          <a:blip r:embed="rId3">
+            <a:extLst>
+              <a:ext uri="{28A0092B-C50C-407E-A947-70E740481C1C}">
+                <a14:useLocalDpi xmlns:a14="http://schemas.microsoft.com/office/drawing/2010/main" val="0"/>
+              </a:ext>
+            </a:extLst>
+          </a:blip>
+          <a:stretch>
+            <a:fillRect/>
+          </a:stretch>
+        </p:blipFill>
+        <p:spPr>
+          <a:xfrm>
+            <a:off x="7599545" y="2193307"/>
+            <a:ext cx="4152900" cy="4203700"/>
+          </a:xfrm>
+          <a:prstGeom prst="rect">
+            <a:avLst/>
+          </a:prstGeom>
+        </p:spPr>
+      </p:pic>
+      <p:sp>
+        <p:nvSpPr>
+          <p:cNvPr id="6" name="TextBox 5"/>
+          <p:cNvSpPr txBox="1"/>
+          <p:nvPr/>
+        </p:nvSpPr>
+        <p:spPr>
+          <a:xfrm>
+            <a:off x="2690771" y="1493611"/>
+            <a:ext cx="2437527" cy="369332"/>
+          </a:xfrm>
+          <a:prstGeom prst="rect">
+            <a:avLst/>
+          </a:prstGeom>
+          <a:noFill/>
+        </p:spPr>
+        <p:txBody>
+          <a:bodyPr wrap="none" rtlCol="0">
+            <a:spAutoFit/>
+          </a:bodyPr>
           <a:lstStyle/>
           <a:p>
             <a:r>
-              <a:rPr lang="en-US" dirty="0" smtClean="0"/>
-              <a:t>TBD</a:t>
+              <a:rPr lang="en-US" smtClean="0"/>
+              <a:t>Gene Synthesizer 4/14</a:t>
             </a:r>
             <a:endParaRPr lang="en-US" dirty="0"/>
+          </a:p>
+        </p:txBody>
+      </p:sp>
+      <p:sp>
+        <p:nvSpPr>
+          <p:cNvPr id="7" name="TextBox 6"/>
+          <p:cNvSpPr txBox="1"/>
+          <p:nvPr/>
+        </p:nvSpPr>
+        <p:spPr>
+          <a:xfrm>
+            <a:off x="8487240" y="1514680"/>
+            <a:ext cx="2377510" cy="369332"/>
+          </a:xfrm>
+          <a:prstGeom prst="rect">
+            <a:avLst/>
+          </a:prstGeom>
+          <a:noFill/>
+        </p:spPr>
+        <p:txBody>
+          <a:bodyPr wrap="none" rtlCol="0">
+            <a:spAutoFit/>
+          </a:bodyPr>
+          <a:lstStyle/>
+          <a:p>
+            <a:r>
+              <a:rPr lang="en-US" smtClean="0"/>
+              <a:t>Nucleotide Mixer 7/11</a:t>
+            </a:r>
+            <a:endParaRPr lang="en-US"/>
           </a:p>
         </p:txBody>
       </p:sp>
@@ -4191,7 +4294,7 @@
           <a:p>
             <a:r>
               <a:rPr lang="en-US" dirty="0" smtClean="0"/>
-              <a:t>Next Steps</a:t>
+              <a:t>Results</a:t>
             </a:r>
             <a:endParaRPr lang="en-US" dirty="0"/>
           </a:p>
@@ -4213,36 +4316,27 @@
           <a:lstStyle/>
           <a:p>
             <a:r>
+              <a:rPr lang="en-US" dirty="0" err="1" smtClean="0"/>
+              <a:t>Overpredicting</a:t>
+            </a:r>
+            <a:r>
               <a:rPr lang="en-US" dirty="0" smtClean="0"/>
-              <a:t>Select only expert player data </a:t>
-            </a:r>
-            <a:r>
-              <a:rPr lang="en-US" smtClean="0"/>
-              <a:t>to </a:t>
-            </a:r>
-            <a:r>
-              <a:rPr lang="en-US" smtClean="0"/>
-              <a:t>train on</a:t>
-            </a:r>
-            <a:endParaRPr lang="en-US" dirty="0" smtClean="0"/>
+              <a:t> U</a:t>
+            </a:r>
           </a:p>
           <a:p>
             <a:r>
               <a:rPr lang="en-US" dirty="0" smtClean="0"/>
-              <a:t>Use reinforcement learning to improve prediction after </a:t>
-            </a:r>
-            <a:r>
-              <a:rPr lang="en-US" dirty="0" smtClean="0"/>
-              <a:t>DNN (explained more on next slides)</a:t>
-            </a:r>
-            <a:endParaRPr lang="en-US" dirty="0" smtClean="0"/>
+              <a:t>Can solve the puzzle up to some extent, but eventually gets stuck and predicts most used base in training data (last week: G; this week: U)</a:t>
+            </a:r>
+            <a:endParaRPr lang="en-US" dirty="0"/>
           </a:p>
         </p:txBody>
       </p:sp>
     </p:spTree>
     <p:extLst>
       <p:ext uri="{BB962C8B-B14F-4D97-AF65-F5344CB8AC3E}">
-        <p14:creationId xmlns:p14="http://schemas.microsoft.com/office/powerpoint/2010/main" val="1947906070"/>
+        <p14:creationId xmlns:p14="http://schemas.microsoft.com/office/powerpoint/2010/main" val="1535591066"/>
       </p:ext>
     </p:extLst>
   </p:cSld>
@@ -4286,6 +4380,131 @@
           <a:p>
             <a:r>
               <a:rPr lang="en-US" dirty="0" smtClean="0"/>
+              <a:t>Next Steps</a:t>
+            </a:r>
+            <a:endParaRPr lang="en-US" dirty="0"/>
+          </a:p>
+        </p:txBody>
+      </p:sp>
+      <p:sp>
+        <p:nvSpPr>
+          <p:cNvPr id="3" name="Content Placeholder 2"/>
+          <p:cNvSpPr>
+            <a:spLocks noGrp="1"/>
+          </p:cNvSpPr>
+          <p:nvPr>
+            <p:ph idx="1"/>
+          </p:nvPr>
+        </p:nvSpPr>
+        <p:spPr/>
+        <p:txBody>
+          <a:bodyPr/>
+          <a:lstStyle/>
+          <a:p>
+            <a:r>
+              <a:rPr lang="en-US" dirty="0" smtClean="0"/>
+              <a:t>Simply adding more puzzles won’t help anymore</a:t>
+            </a:r>
+            <a:r>
+              <a:rPr lang="mr-IN" dirty="0" smtClean="0"/>
+              <a:t>–</a:t>
+            </a:r>
+            <a:r>
+              <a:rPr lang="en-US" dirty="0" smtClean="0"/>
+              <a:t> will have to be more selective</a:t>
+            </a:r>
+          </a:p>
+          <a:p>
+            <a:r>
+              <a:rPr lang="en-US" dirty="0" smtClean="0"/>
+              <a:t>Select </a:t>
+            </a:r>
+            <a:r>
+              <a:rPr lang="en-US" dirty="0" smtClean="0"/>
+              <a:t>only expert player data to train </a:t>
+            </a:r>
+            <a:r>
+              <a:rPr lang="en-US" dirty="0" smtClean="0"/>
+              <a:t>on</a:t>
+            </a:r>
+          </a:p>
+          <a:p>
+            <a:r>
+              <a:rPr lang="en-US" dirty="0" smtClean="0"/>
+              <a:t>Use </a:t>
+            </a:r>
+            <a:r>
+              <a:rPr lang="en-US" dirty="0" err="1" smtClean="0"/>
+              <a:t>NumPy</a:t>
+            </a:r>
+            <a:r>
+              <a:rPr lang="en-US" dirty="0" smtClean="0"/>
+              <a:t> arrays when saving data (much faster than using lists and pickling)</a:t>
+            </a:r>
+            <a:endParaRPr lang="en-US" dirty="0" smtClean="0"/>
+          </a:p>
+          <a:p>
+            <a:r>
+              <a:rPr lang="en-US" dirty="0" smtClean="0"/>
+              <a:t>Balance data</a:t>
+            </a:r>
+            <a:endParaRPr lang="en-US" dirty="0" smtClean="0"/>
+          </a:p>
+          <a:p>
+            <a:r>
+              <a:rPr lang="en-US" dirty="0" smtClean="0"/>
+              <a:t>Use reinforcement learning to improve prediction after DNN (explained more on next slides)</a:t>
+            </a:r>
+          </a:p>
+        </p:txBody>
+      </p:sp>
+    </p:spTree>
+    <p:extLst>
+      <p:ext uri="{BB962C8B-B14F-4D97-AF65-F5344CB8AC3E}">
+        <p14:creationId xmlns:p14="http://schemas.microsoft.com/office/powerpoint/2010/main" val="1947906070"/>
+      </p:ext>
+    </p:extLst>
+  </p:cSld>
+  <p:clrMapOvr>
+    <a:masterClrMapping/>
+  </p:clrMapOvr>
+</p:sld>
+</file>
+
+<file path=ppt/slides/slide7.xml><?xml version="1.0" encoding="utf-8"?>
+<p:sld xmlns:a="http://schemas.openxmlformats.org/drawingml/2006/main" xmlns:r="http://schemas.openxmlformats.org/officeDocument/2006/relationships" xmlns:p="http://schemas.openxmlformats.org/presentationml/2006/main">
+  <p:cSld>
+    <p:spTree>
+      <p:nvGrpSpPr>
+        <p:cNvPr id="1" name=""/>
+        <p:cNvGrpSpPr/>
+        <p:nvPr/>
+      </p:nvGrpSpPr>
+      <p:grpSpPr>
+        <a:xfrm>
+          <a:off x="0" y="0"/>
+          <a:ext cx="0" cy="0"/>
+          <a:chOff x="0" y="0"/>
+          <a:chExt cx="0" cy="0"/>
+        </a:xfrm>
+      </p:grpSpPr>
+      <p:sp>
+        <p:nvSpPr>
+          <p:cNvPr id="2" name="Title 1"/>
+          <p:cNvSpPr>
+            <a:spLocks noGrp="1"/>
+          </p:cNvSpPr>
+          <p:nvPr>
+            <p:ph type="title"/>
+          </p:nvPr>
+        </p:nvSpPr>
+        <p:spPr/>
+        <p:txBody>
+          <a:bodyPr/>
+          <a:lstStyle/>
+          <a:p>
+            <a:r>
+              <a:rPr lang="en-US" dirty="0" smtClean="0"/>
               <a:t>Reinforcement Learning</a:t>
             </a:r>
             <a:endParaRPr lang="en-US" dirty="0"/>
@@ -4351,7 +4570,7 @@
 </p:sld>
 </file>
 
-<file path=ppt/slides/slide7.xml><?xml version="1.0" encoding="utf-8"?>
+<file path=ppt/slides/slide8.xml><?xml version="1.0" encoding="utf-8"?>
 <p:sld xmlns:a="http://schemas.openxmlformats.org/drawingml/2006/main" xmlns:r="http://schemas.openxmlformats.org/officeDocument/2006/relationships" xmlns:p="http://schemas.openxmlformats.org/presentationml/2006/main">
   <p:cSld>
     <p:spTree>

</xml_diff>

<commit_message>
Add updates - 8/3/17
</commit_message>
<xml_diff>
--- a/updates/7-13-17.pptx
+++ b/updates/7-13-17.pptx
@@ -4020,13 +4020,8 @@
           <a:p>
             <a:r>
               <a:rPr lang="en-US" dirty="0" smtClean="0"/>
-              <a:t>Validate on </a:t>
-            </a:r>
-            <a:r>
-              <a:rPr lang="en-US" dirty="0" smtClean="0"/>
-              <a:t>Gene Synthesizer 4/14 and Nucleotide Mixer 7/11</a:t>
-            </a:r>
-            <a:endParaRPr lang="en-US" dirty="0" smtClean="0"/>
+              <a:t>Validate on Gene Synthesizer 4/14 and Nucleotide Mixer 7/11</a:t>
+            </a:r>
           </a:p>
           <a:p>
             <a:r>
@@ -4195,8 +4190,8 @@
         </p:nvSpPr>
         <p:spPr>
           <a:xfrm>
-            <a:off x="2690771" y="1493611"/>
-            <a:ext cx="2437527" cy="369332"/>
+            <a:off x="2281333" y="1497443"/>
+            <a:ext cx="3256404" cy="369332"/>
           </a:xfrm>
           <a:prstGeom prst="rect">
             <a:avLst/>
@@ -4210,8 +4205,8 @@
           <a:lstStyle/>
           <a:p>
             <a:r>
-              <a:rPr lang="en-US" smtClean="0"/>
-              <a:t>Gene Synthesizer 4/14</a:t>
+              <a:rPr lang="en-US" dirty="0" smtClean="0"/>
+              <a:t>Gene Synthesizer 4/14 (solved)</a:t>
             </a:r>
             <a:endParaRPr lang="en-US" dirty="0"/>
           </a:p>
@@ -4329,6 +4324,34 @@
               <a:rPr lang="en-US" dirty="0" smtClean="0"/>
               <a:t>Can solve the puzzle up to some extent, but eventually gets stuck and predicts most used base in training data (last week: G; this week: U)</a:t>
             </a:r>
+          </a:p>
+          <a:p>
+            <a:r>
+              <a:rPr lang="en-US" dirty="0" smtClean="0"/>
+              <a:t>Overall, performing similarly to how old model performed (deep neural net, 500K moves, 700 epochs, 250 nodes, 5 fully-connected layers</a:t>
+            </a:r>
+            <a:r>
+              <a:rPr lang="en-US" dirty="0" smtClean="0"/>
+              <a:t>)</a:t>
+            </a:r>
+          </a:p>
+          <a:p>
+            <a:r>
+              <a:rPr lang="en-US" dirty="0"/>
+              <a:t>Simply adding more puzzles won’t help anymore</a:t>
+            </a:r>
+            <a:r>
+              <a:rPr lang="mr-IN" dirty="0"/>
+              <a:t>–</a:t>
+            </a:r>
+            <a:r>
+              <a:rPr lang="en-US" dirty="0"/>
+              <a:t> will have to be more </a:t>
+            </a:r>
+            <a:r>
+              <a:rPr lang="en-US" dirty="0" smtClean="0"/>
+              <a:t>selective</a:t>
+            </a:r>
             <a:endParaRPr lang="en-US" dirty="0"/>
           </a:p>
         </p:txBody>
@@ -4403,29 +4426,11 @@
           <a:p>
             <a:r>
               <a:rPr lang="en-US" dirty="0" smtClean="0"/>
-              <a:t>Simply adding more puzzles won’t help anymore</a:t>
-            </a:r>
-            <a:r>
-              <a:rPr lang="mr-IN" dirty="0" smtClean="0"/>
-              <a:t>–</a:t>
+              <a:t>Select </a:t>
             </a:r>
             <a:r>
               <a:rPr lang="en-US" dirty="0" smtClean="0"/>
-              <a:t> will have to be more selective</a:t>
-            </a:r>
-          </a:p>
-          <a:p>
-            <a:r>
-              <a:rPr lang="en-US" dirty="0" smtClean="0"/>
-              <a:t>Select </a:t>
-            </a:r>
-            <a:r>
-              <a:rPr lang="en-US" dirty="0" smtClean="0"/>
-              <a:t>only expert player data to train </a:t>
-            </a:r>
-            <a:r>
-              <a:rPr lang="en-US" dirty="0" smtClean="0"/>
-              <a:t>on</a:t>
+              <a:t>only expert player data to train on</a:t>
             </a:r>
           </a:p>
           <a:p>
@@ -4441,19 +4446,17 @@
               <a:rPr lang="en-US" dirty="0" smtClean="0"/>
               <a:t> arrays when saving data (much faster than using lists and pickling)</a:t>
             </a:r>
-            <a:endParaRPr lang="en-US" dirty="0" smtClean="0"/>
           </a:p>
           <a:p>
             <a:r>
               <a:rPr lang="en-US" dirty="0" smtClean="0"/>
               <a:t>Balance data</a:t>
             </a:r>
-            <a:endParaRPr lang="en-US" dirty="0" smtClean="0"/>
           </a:p>
           <a:p>
             <a:r>
               <a:rPr lang="en-US" dirty="0" smtClean="0"/>
-              <a:t>Use reinforcement learning to improve prediction after DNN (explained more on next slides)</a:t>
+              <a:t>Use reinforcement learning to improve prediction after DNN (explained more on next slides), or use RL separately altogether</a:t>
             </a:r>
           </a:p>
         </p:txBody>

</xml_diff>